<commit_message>
Chap05: Correction on experimental setup.
</commit_message>
<xml_diff>
--- a/05-CrDyn/Pictures/ExperimentSchema.pptx
+++ b/05-CrDyn/Pictures/ExperimentSchema.pptx
@@ -288,7 +288,7 @@
           <a:p>
             <a:fld id="{B016335D-3260-4588-AF31-90AD8532CCCE}" type="datetimeFigureOut">
               <a:rPr lang="fr-FR" smtClean="0"/>
-              <a:t>02/07/2017</a:t>
+              <a:t>03/07/2017</a:t>
             </a:fld>
             <a:endParaRPr lang="fr-FR"/>
           </a:p>
@@ -458,7 +458,7 @@
           <a:p>
             <a:fld id="{B016335D-3260-4588-AF31-90AD8532CCCE}" type="datetimeFigureOut">
               <a:rPr lang="fr-FR" smtClean="0"/>
-              <a:t>02/07/2017</a:t>
+              <a:t>03/07/2017</a:t>
             </a:fld>
             <a:endParaRPr lang="fr-FR"/>
           </a:p>
@@ -638,7 +638,7 @@
           <a:p>
             <a:fld id="{B016335D-3260-4588-AF31-90AD8532CCCE}" type="datetimeFigureOut">
               <a:rPr lang="fr-FR" smtClean="0"/>
-              <a:t>02/07/2017</a:t>
+              <a:t>03/07/2017</a:t>
             </a:fld>
             <a:endParaRPr lang="fr-FR"/>
           </a:p>
@@ -808,7 +808,7 @@
           <a:p>
             <a:fld id="{B016335D-3260-4588-AF31-90AD8532CCCE}" type="datetimeFigureOut">
               <a:rPr lang="fr-FR" smtClean="0"/>
-              <a:t>02/07/2017</a:t>
+              <a:t>03/07/2017</a:t>
             </a:fld>
             <a:endParaRPr lang="fr-FR"/>
           </a:p>
@@ -1054,7 +1054,7 @@
           <a:p>
             <a:fld id="{B016335D-3260-4588-AF31-90AD8532CCCE}" type="datetimeFigureOut">
               <a:rPr lang="fr-FR" smtClean="0"/>
-              <a:t>02/07/2017</a:t>
+              <a:t>03/07/2017</a:t>
             </a:fld>
             <a:endParaRPr lang="fr-FR"/>
           </a:p>
@@ -1342,7 +1342,7 @@
           <a:p>
             <a:fld id="{B016335D-3260-4588-AF31-90AD8532CCCE}" type="datetimeFigureOut">
               <a:rPr lang="fr-FR" smtClean="0"/>
-              <a:t>02/07/2017</a:t>
+              <a:t>03/07/2017</a:t>
             </a:fld>
             <a:endParaRPr lang="fr-FR"/>
           </a:p>
@@ -1764,7 +1764,7 @@
           <a:p>
             <a:fld id="{B016335D-3260-4588-AF31-90AD8532CCCE}" type="datetimeFigureOut">
               <a:rPr lang="fr-FR" smtClean="0"/>
-              <a:t>02/07/2017</a:t>
+              <a:t>03/07/2017</a:t>
             </a:fld>
             <a:endParaRPr lang="fr-FR"/>
           </a:p>
@@ -1882,7 +1882,7 @@
           <a:p>
             <a:fld id="{B016335D-3260-4588-AF31-90AD8532CCCE}" type="datetimeFigureOut">
               <a:rPr lang="fr-FR" smtClean="0"/>
-              <a:t>02/07/2017</a:t>
+              <a:t>03/07/2017</a:t>
             </a:fld>
             <a:endParaRPr lang="fr-FR"/>
           </a:p>
@@ -1977,7 +1977,7 @@
           <a:p>
             <a:fld id="{B016335D-3260-4588-AF31-90AD8532CCCE}" type="datetimeFigureOut">
               <a:rPr lang="fr-FR" smtClean="0"/>
-              <a:t>02/07/2017</a:t>
+              <a:t>03/07/2017</a:t>
             </a:fld>
             <a:endParaRPr lang="fr-FR"/>
           </a:p>
@@ -2254,7 +2254,7 @@
           <a:p>
             <a:fld id="{B016335D-3260-4588-AF31-90AD8532CCCE}" type="datetimeFigureOut">
               <a:rPr lang="fr-FR" smtClean="0"/>
-              <a:t>02/07/2017</a:t>
+              <a:t>03/07/2017</a:t>
             </a:fld>
             <a:endParaRPr lang="fr-FR"/>
           </a:p>
@@ -2507,7 +2507,7 @@
           <a:p>
             <a:fld id="{B016335D-3260-4588-AF31-90AD8532CCCE}" type="datetimeFigureOut">
               <a:rPr lang="fr-FR" smtClean="0"/>
-              <a:t>02/07/2017</a:t>
+              <a:t>03/07/2017</a:t>
             </a:fld>
             <a:endParaRPr lang="fr-FR"/>
           </a:p>
@@ -2720,7 +2720,7 @@
           <a:p>
             <a:fld id="{B016335D-3260-4588-AF31-90AD8532CCCE}" type="datetimeFigureOut">
               <a:rPr lang="fr-FR" smtClean="0"/>
-              <a:t>02/07/2017</a:t>
+              <a:t>03/07/2017</a:t>
             </a:fld>
             <a:endParaRPr lang="fr-FR"/>
           </a:p>
@@ -4005,7 +4005,7 @@
         </p:nvSpPr>
         <p:spPr>
           <a:xfrm>
-            <a:off x="7027355" y="2631883"/>
+            <a:off x="7171296" y="2631883"/>
             <a:ext cx="2045753" cy="830997"/>
           </a:xfrm>
           <a:prstGeom prst="rect">
@@ -4865,7 +4865,7 @@
         </p:nvSpPr>
         <p:spPr>
           <a:xfrm>
-            <a:off x="2229283" y="5442183"/>
+            <a:off x="2229283" y="5310634"/>
             <a:ext cx="2045752" cy="830997"/>
           </a:xfrm>
           <a:prstGeom prst="rect">

</xml_diff>

<commit_message>
Chap05: pictures and captions v1.0
</commit_message>
<xml_diff>
--- a/05-CrDyn/Pictures/ExperimentSchema.pptx
+++ b/05-CrDyn/Pictures/ExperimentSchema.pptx
@@ -3097,13 +3097,13 @@
       </p:grpSpPr>
       <p:cxnSp>
         <p:nvCxnSpPr>
-          <p:cNvPr id="562" name="Connecteur droit 561"/>
+          <p:cNvPr id="134" name="Connecteur droit 133"/>
           <p:cNvCxnSpPr/>
           <p:nvPr/>
         </p:nvCxnSpPr>
         <p:spPr>
-          <a:xfrm>
-            <a:off x="8010000" y="8064996"/>
+          <a:xfrm rot="5400000">
+            <a:off x="5506902" y="6626507"/>
             <a:ext cx="792088" cy="0"/>
           </a:xfrm>
           <a:prstGeom prst="line">
@@ -3115,6 +3115,380 @@
                 <a:lumMod val="50000"/>
               </a:schemeClr>
             </a:solidFill>
+          </a:ln>
+        </p:spPr>
+        <p:style>
+          <a:lnRef idx="1">
+            <a:schemeClr val="accent1"/>
+          </a:lnRef>
+          <a:fillRef idx="0">
+            <a:schemeClr val="accent1"/>
+          </a:fillRef>
+          <a:effectRef idx="0">
+            <a:schemeClr val="accent1"/>
+          </a:effectRef>
+          <a:fontRef idx="minor">
+            <a:schemeClr val="tx1"/>
+          </a:fontRef>
+        </p:style>
+      </p:cxnSp>
+      <p:cxnSp>
+        <p:nvCxnSpPr>
+          <p:cNvPr id="132" name="Connecteur droit 131"/>
+          <p:cNvCxnSpPr/>
+          <p:nvPr/>
+        </p:nvCxnSpPr>
+        <p:spPr>
+          <a:xfrm>
+            <a:off x="6292712" y="5488121"/>
+            <a:ext cx="792088" cy="0"/>
+          </a:xfrm>
+          <a:prstGeom prst="line">
+            <a:avLst/>
+          </a:prstGeom>
+          <a:ln w="38100">
+            <a:solidFill>
+              <a:schemeClr val="bg1">
+                <a:lumMod val="50000"/>
+              </a:schemeClr>
+            </a:solidFill>
+          </a:ln>
+        </p:spPr>
+        <p:style>
+          <a:lnRef idx="1">
+            <a:schemeClr val="accent1"/>
+          </a:lnRef>
+          <a:fillRef idx="0">
+            <a:schemeClr val="accent1"/>
+          </a:fillRef>
+          <a:effectRef idx="0">
+            <a:schemeClr val="accent1"/>
+          </a:effectRef>
+          <a:fontRef idx="minor">
+            <a:schemeClr val="tx1"/>
+          </a:fontRef>
+        </p:style>
+      </p:cxnSp>
+      <p:cxnSp>
+        <p:nvCxnSpPr>
+          <p:cNvPr id="118" name="Connecteur droit 117"/>
+          <p:cNvCxnSpPr/>
+          <p:nvPr/>
+        </p:nvCxnSpPr>
+        <p:spPr>
+          <a:xfrm>
+            <a:off x="8009999" y="7686898"/>
+            <a:ext cx="792088" cy="0"/>
+          </a:xfrm>
+          <a:prstGeom prst="line">
+            <a:avLst/>
+          </a:prstGeom>
+          <a:ln w="38100">
+            <a:solidFill>
+              <a:schemeClr val="bg1">
+                <a:lumMod val="50000"/>
+              </a:schemeClr>
+            </a:solidFill>
+          </a:ln>
+        </p:spPr>
+        <p:style>
+          <a:lnRef idx="1">
+            <a:schemeClr val="accent1"/>
+          </a:lnRef>
+          <a:fillRef idx="0">
+            <a:schemeClr val="accent1"/>
+          </a:fillRef>
+          <a:effectRef idx="0">
+            <a:schemeClr val="accent1"/>
+          </a:effectRef>
+          <a:fontRef idx="minor">
+            <a:schemeClr val="tx1"/>
+          </a:fontRef>
+        </p:style>
+      </p:cxnSp>
+      <p:sp>
+        <p:nvSpPr>
+          <p:cNvPr id="52" name="Rectangle 51"/>
+          <p:cNvSpPr/>
+          <p:nvPr/>
+        </p:nvSpPr>
+        <p:spPr>
+          <a:xfrm>
+            <a:off x="6452080" y="10178979"/>
+            <a:ext cx="898214" cy="360040"/>
+          </a:xfrm>
+          <a:prstGeom prst="rect">
+            <a:avLst/>
+          </a:prstGeom>
+          <a:solidFill>
+            <a:schemeClr val="tx1"/>
+          </a:solidFill>
+          <a:ln>
+            <a:solidFill>
+              <a:schemeClr val="tx1"/>
+            </a:solidFill>
+          </a:ln>
+        </p:spPr>
+        <p:style>
+          <a:lnRef idx="2">
+            <a:schemeClr val="accent1">
+              <a:shade val="50000"/>
+            </a:schemeClr>
+          </a:lnRef>
+          <a:fillRef idx="1">
+            <a:schemeClr val="accent1"/>
+          </a:fillRef>
+          <a:effectRef idx="0">
+            <a:schemeClr val="accent1"/>
+          </a:effectRef>
+          <a:fontRef idx="minor">
+            <a:schemeClr val="lt1"/>
+          </a:fontRef>
+        </p:style>
+        <p:txBody>
+          <a:bodyPr rtlCol="0" anchor="ctr"/>
+          <a:lstStyle/>
+          <a:p>
+            <a:pPr algn="ctr"/>
+            <a:endParaRPr lang="fr-FR"/>
+          </a:p>
+        </p:txBody>
+      </p:sp>
+      <p:cxnSp>
+        <p:nvCxnSpPr>
+          <p:cNvPr id="100" name="Connecteur droit 99"/>
+          <p:cNvCxnSpPr/>
+          <p:nvPr/>
+        </p:nvCxnSpPr>
+        <p:spPr>
+          <a:xfrm flipV="1">
+            <a:off x="6676678" y="6593422"/>
+            <a:ext cx="884187" cy="844"/>
+          </a:xfrm>
+          <a:prstGeom prst="line">
+            <a:avLst/>
+          </a:prstGeom>
+          <a:ln w="28575">
+            <a:solidFill>
+              <a:schemeClr val="accent6"/>
+            </a:solidFill>
+            <a:tailEnd type="arrow"/>
+          </a:ln>
+        </p:spPr>
+        <p:style>
+          <a:lnRef idx="1">
+            <a:schemeClr val="accent1"/>
+          </a:lnRef>
+          <a:fillRef idx="0">
+            <a:schemeClr val="accent1"/>
+          </a:fillRef>
+          <a:effectRef idx="0">
+            <a:schemeClr val="accent1"/>
+          </a:effectRef>
+          <a:fontRef idx="minor">
+            <a:schemeClr val="tx1"/>
+          </a:fontRef>
+        </p:style>
+      </p:cxnSp>
+      <p:cxnSp>
+        <p:nvCxnSpPr>
+          <p:cNvPr id="590" name="Connecteur droit 589"/>
+          <p:cNvCxnSpPr/>
+          <p:nvPr/>
+        </p:nvCxnSpPr>
+        <p:spPr>
+          <a:xfrm>
+            <a:off x="6679842" y="6594266"/>
+            <a:ext cx="3724806" cy="0"/>
+          </a:xfrm>
+          <a:prstGeom prst="line">
+            <a:avLst/>
+          </a:prstGeom>
+          <a:ln w="28575">
+            <a:solidFill>
+              <a:schemeClr val="accent6"/>
+            </a:solidFill>
+          </a:ln>
+        </p:spPr>
+        <p:style>
+          <a:lnRef idx="1">
+            <a:schemeClr val="accent1"/>
+          </a:lnRef>
+          <a:fillRef idx="0">
+            <a:schemeClr val="accent1"/>
+          </a:fillRef>
+          <a:effectRef idx="0">
+            <a:schemeClr val="accent1"/>
+          </a:effectRef>
+          <a:fontRef idx="minor">
+            <a:schemeClr val="tx1"/>
+          </a:fontRef>
+        </p:style>
+      </p:cxnSp>
+      <p:cxnSp>
+        <p:nvCxnSpPr>
+          <p:cNvPr id="591" name="Connecteur droit 590"/>
+          <p:cNvCxnSpPr/>
+          <p:nvPr/>
+        </p:nvCxnSpPr>
+        <p:spPr>
+          <a:xfrm>
+            <a:off x="3352817" y="6594266"/>
+            <a:ext cx="6958387" cy="0"/>
+          </a:xfrm>
+          <a:prstGeom prst="line">
+            <a:avLst/>
+          </a:prstGeom>
+          <a:ln w="28575">
+            <a:solidFill>
+              <a:srgbClr val="FF0000"/>
+            </a:solidFill>
+            <a:prstDash val="dash"/>
+          </a:ln>
+        </p:spPr>
+        <p:style>
+          <a:lnRef idx="1">
+            <a:schemeClr val="accent1"/>
+          </a:lnRef>
+          <a:fillRef idx="0">
+            <a:schemeClr val="accent1"/>
+          </a:fillRef>
+          <a:effectRef idx="0">
+            <a:schemeClr val="accent1"/>
+          </a:effectRef>
+          <a:fontRef idx="minor">
+            <a:schemeClr val="tx1"/>
+          </a:fontRef>
+        </p:style>
+      </p:cxnSp>
+      <p:cxnSp>
+        <p:nvCxnSpPr>
+          <p:cNvPr id="106" name="Connecteur droit 105"/>
+          <p:cNvCxnSpPr/>
+          <p:nvPr/>
+        </p:nvCxnSpPr>
+        <p:spPr>
+          <a:xfrm>
+            <a:off x="3352817" y="6594266"/>
+            <a:ext cx="4496080" cy="0"/>
+          </a:xfrm>
+          <a:prstGeom prst="line">
+            <a:avLst/>
+          </a:prstGeom>
+          <a:ln w="28575">
+            <a:solidFill>
+              <a:srgbClr val="FF0000"/>
+            </a:solidFill>
+            <a:prstDash val="dash"/>
+            <a:tailEnd type="arrow"/>
+          </a:ln>
+        </p:spPr>
+        <p:style>
+          <a:lnRef idx="1">
+            <a:schemeClr val="accent1"/>
+          </a:lnRef>
+          <a:fillRef idx="0">
+            <a:schemeClr val="accent1"/>
+          </a:fillRef>
+          <a:effectRef idx="0">
+            <a:schemeClr val="accent1"/>
+          </a:effectRef>
+          <a:fontRef idx="minor">
+            <a:schemeClr val="tx1"/>
+          </a:fontRef>
+        </p:style>
+      </p:cxnSp>
+      <p:cxnSp>
+        <p:nvCxnSpPr>
+          <p:cNvPr id="562" name="Connecteur droit 561"/>
+          <p:cNvCxnSpPr/>
+          <p:nvPr/>
+        </p:nvCxnSpPr>
+        <p:spPr>
+          <a:xfrm>
+            <a:off x="8010000" y="8064996"/>
+            <a:ext cx="792088" cy="0"/>
+          </a:xfrm>
+          <a:prstGeom prst="line">
+            <a:avLst/>
+          </a:prstGeom>
+          <a:ln w="38100">
+            <a:solidFill>
+              <a:schemeClr val="bg1">
+                <a:lumMod val="50000"/>
+              </a:schemeClr>
+            </a:solidFill>
+          </a:ln>
+        </p:spPr>
+        <p:style>
+          <a:lnRef idx="1">
+            <a:schemeClr val="accent1"/>
+          </a:lnRef>
+          <a:fillRef idx="0">
+            <a:schemeClr val="accent1"/>
+          </a:fillRef>
+          <a:effectRef idx="0">
+            <a:schemeClr val="accent1"/>
+          </a:effectRef>
+          <a:fontRef idx="minor">
+            <a:schemeClr val="tx1"/>
+          </a:fontRef>
+        </p:style>
+      </p:cxnSp>
+      <p:cxnSp>
+        <p:nvCxnSpPr>
+          <p:cNvPr id="603" name="Connecteur droit 602"/>
+          <p:cNvCxnSpPr/>
+          <p:nvPr/>
+        </p:nvCxnSpPr>
+        <p:spPr>
+          <a:xfrm>
+            <a:off x="8413848" y="6608635"/>
+            <a:ext cx="0" cy="2032425"/>
+          </a:xfrm>
+          <a:prstGeom prst="line">
+            <a:avLst/>
+          </a:prstGeom>
+          <a:ln w="28575">
+            <a:solidFill>
+              <a:srgbClr val="C00000"/>
+            </a:solidFill>
+          </a:ln>
+        </p:spPr>
+        <p:style>
+          <a:lnRef idx="1">
+            <a:schemeClr val="accent1"/>
+          </a:lnRef>
+          <a:fillRef idx="0">
+            <a:schemeClr val="accent1"/>
+          </a:fillRef>
+          <a:effectRef idx="0">
+            <a:schemeClr val="accent1"/>
+          </a:effectRef>
+          <a:fontRef idx="minor">
+            <a:schemeClr val="tx1"/>
+          </a:fontRef>
+        </p:style>
+      </p:cxnSp>
+      <p:cxnSp>
+        <p:nvCxnSpPr>
+          <p:cNvPr id="110" name="Connecteur droit 109"/>
+          <p:cNvCxnSpPr/>
+          <p:nvPr/>
+        </p:nvCxnSpPr>
+        <p:spPr>
+          <a:xfrm>
+            <a:off x="8413848" y="6621575"/>
+            <a:ext cx="0" cy="1713395"/>
+          </a:xfrm>
+          <a:prstGeom prst="line">
+            <a:avLst/>
+          </a:prstGeom>
+          <a:ln w="28575">
+            <a:solidFill>
+              <a:srgbClr val="C00000"/>
+            </a:solidFill>
+            <a:tailEnd type="arrow"/>
           </a:ln>
         </p:spPr>
         <p:style>
@@ -4146,77 +4520,6 @@
       </p:grpSp>
       <p:cxnSp>
         <p:nvCxnSpPr>
-          <p:cNvPr id="590" name="Connecteur droit 589"/>
-          <p:cNvCxnSpPr/>
-          <p:nvPr/>
-        </p:nvCxnSpPr>
-        <p:spPr>
-          <a:xfrm>
-            <a:off x="6679842" y="6594266"/>
-            <a:ext cx="3724806" cy="0"/>
-          </a:xfrm>
-          <a:prstGeom prst="line">
-            <a:avLst/>
-          </a:prstGeom>
-          <a:ln w="28575">
-            <a:solidFill>
-              <a:schemeClr val="accent6"/>
-            </a:solidFill>
-          </a:ln>
-        </p:spPr>
-        <p:style>
-          <a:lnRef idx="1">
-            <a:schemeClr val="accent1"/>
-          </a:lnRef>
-          <a:fillRef idx="0">
-            <a:schemeClr val="accent1"/>
-          </a:fillRef>
-          <a:effectRef idx="0">
-            <a:schemeClr val="accent1"/>
-          </a:effectRef>
-          <a:fontRef idx="minor">
-            <a:schemeClr val="tx1"/>
-          </a:fontRef>
-        </p:style>
-      </p:cxnSp>
-      <p:cxnSp>
-        <p:nvCxnSpPr>
-          <p:cNvPr id="591" name="Connecteur droit 590"/>
-          <p:cNvCxnSpPr/>
-          <p:nvPr/>
-        </p:nvCxnSpPr>
-        <p:spPr>
-          <a:xfrm>
-            <a:off x="3352817" y="6594266"/>
-            <a:ext cx="6958387" cy="0"/>
-          </a:xfrm>
-          <a:prstGeom prst="line">
-            <a:avLst/>
-          </a:prstGeom>
-          <a:ln w="28575">
-            <a:solidFill>
-              <a:srgbClr val="FF0000"/>
-            </a:solidFill>
-            <a:prstDash val="dash"/>
-          </a:ln>
-        </p:spPr>
-        <p:style>
-          <a:lnRef idx="1">
-            <a:schemeClr val="accent1"/>
-          </a:lnRef>
-          <a:fillRef idx="0">
-            <a:schemeClr val="accent1"/>
-          </a:fillRef>
-          <a:effectRef idx="0">
-            <a:schemeClr val="accent1"/>
-          </a:effectRef>
-          <a:fontRef idx="minor">
-            <a:schemeClr val="tx1"/>
-          </a:fontRef>
-        </p:style>
-      </p:cxnSp>
-      <p:cxnSp>
-        <p:nvCxnSpPr>
           <p:cNvPr id="592" name="Connecteur droit 591"/>
           <p:cNvCxnSpPr/>
           <p:nvPr/>
@@ -4363,7 +4666,7 @@
         </p:nvSpPr>
         <p:spPr>
           <a:xfrm>
-            <a:off x="8855356" y="5472708"/>
+            <a:off x="9020221" y="5472708"/>
             <a:ext cx="1636988" cy="830997"/>
           </a:xfrm>
           <a:prstGeom prst="rect">
@@ -4676,41 +4979,6 @@
           </a:p>
         </p:txBody>
       </p:sp>
-      <p:cxnSp>
-        <p:nvCxnSpPr>
-          <p:cNvPr id="603" name="Connecteur droit 602"/>
-          <p:cNvCxnSpPr/>
-          <p:nvPr/>
-        </p:nvCxnSpPr>
-        <p:spPr>
-          <a:xfrm>
-            <a:off x="8413848" y="6608635"/>
-            <a:ext cx="0" cy="2032425"/>
-          </a:xfrm>
-          <a:prstGeom prst="line">
-            <a:avLst/>
-          </a:prstGeom>
-          <a:ln w="28575">
-            <a:solidFill>
-              <a:srgbClr val="C00000"/>
-            </a:solidFill>
-          </a:ln>
-        </p:spPr>
-        <p:style>
-          <a:lnRef idx="1">
-            <a:schemeClr val="accent1"/>
-          </a:lnRef>
-          <a:fillRef idx="0">
-            <a:schemeClr val="accent1"/>
-          </a:fillRef>
-          <a:effectRef idx="0">
-            <a:schemeClr val="accent1"/>
-          </a:effectRef>
-          <a:fontRef idx="minor">
-            <a:schemeClr val="tx1"/>
-          </a:fontRef>
-        </p:style>
-      </p:cxnSp>
       <p:sp>
         <p:nvSpPr>
           <p:cNvPr id="604" name="ZoneTexte 603"/>
@@ -4719,8 +4987,8 @@
         </p:nvSpPr>
         <p:spPr>
           <a:xfrm>
-            <a:off x="8705920" y="7848972"/>
-            <a:ext cx="1295547" cy="461665"/>
+            <a:off x="8787201" y="7848972"/>
+            <a:ext cx="1293944" cy="461665"/>
           </a:xfrm>
           <a:prstGeom prst="rect">
             <a:avLst/>
@@ -4735,11 +5003,11 @@
           <a:p>
             <a:pPr algn="ctr"/>
             <a:r>
-              <a:rPr lang="fr-FR" sz="2400" dirty="0" smtClean="0">
+              <a:rPr lang="fr-FR" sz="2400" dirty="0" err="1" smtClean="0">
                 <a:latin typeface="Times New Roman" panose="02020603050405020304" pitchFamily="18" charset="0"/>
                 <a:cs typeface="Times New Roman" panose="02020603050405020304" pitchFamily="18" charset="0"/>
               </a:rPr>
-              <a:t>Analyser</a:t>
+              <a:t>Polarizer</a:t>
             </a:r>
             <a:endParaRPr lang="fr-FR" sz="2400" dirty="0">
               <a:latin typeface="Times New Roman" panose="02020603050405020304" pitchFamily="18" charset="0"/>
@@ -4797,7 +5065,7 @@
                 <a:latin typeface="Times New Roman" panose="02020603050405020304" pitchFamily="18" charset="0"/>
                 <a:cs typeface="Times New Roman" panose="02020603050405020304" pitchFamily="18" charset="0"/>
               </a:rPr>
-              <a:t>1m </a:t>
+              <a:t>Double </a:t>
             </a:r>
             <a:r>
               <a:rPr lang="fr-FR" sz="2400" dirty="0" err="1" smtClean="0">
@@ -4806,6 +5074,28 @@
               </a:rPr>
               <a:t>monochromator</a:t>
             </a:r>
+            <a:endParaRPr lang="fr-FR" sz="2400" dirty="0" smtClean="0">
+              <a:latin typeface="Times New Roman" panose="02020603050405020304" pitchFamily="18" charset="0"/>
+              <a:cs typeface="Times New Roman" panose="02020603050405020304" pitchFamily="18" charset="0"/>
+            </a:endParaRPr>
+          </a:p>
+          <a:p>
+            <a:r>
+              <a:rPr lang="fr-FR" sz="2400" dirty="0" smtClean="0">
+                <a:latin typeface="Times New Roman" panose="02020603050405020304" pitchFamily="18" charset="0"/>
+                <a:cs typeface="Times New Roman" panose="02020603050405020304" pitchFamily="18" charset="0"/>
+              </a:rPr>
+              <a:t>  2x 1m</a:t>
+            </a:r>
+          </a:p>
+          <a:p>
+            <a:r>
+              <a:rPr lang="fr-FR" sz="2400" dirty="0" smtClean="0">
+                <a:latin typeface="Times New Roman" panose="02020603050405020304" pitchFamily="18" charset="0"/>
+                <a:cs typeface="Times New Roman" panose="02020603050405020304" pitchFamily="18" charset="0"/>
+              </a:rPr>
+              <a:t>  2x 1800 g/mm</a:t>
+            </a:r>
             <a:endParaRPr lang="fr-FR" sz="2400" dirty="0">
               <a:latin typeface="Times New Roman" panose="02020603050405020304" pitchFamily="18" charset="0"/>
               <a:cs typeface="Times New Roman" panose="02020603050405020304" pitchFamily="18" charset="0"/>
@@ -4865,7 +5155,7 @@
         </p:nvSpPr>
         <p:spPr>
           <a:xfrm>
-            <a:off x="2229283" y="5199717"/>
+            <a:off x="3138849" y="5271725"/>
             <a:ext cx="2045752" cy="830997"/>
           </a:xfrm>
           <a:prstGeom prst="rect">
@@ -4908,6 +5198,1536 @@
           </a:p>
         </p:txBody>
       </p:sp>
+      <p:pic>
+        <p:nvPicPr>
+          <p:cNvPr id="1026" name="Picture 2"/>
+          <p:cNvPicPr>
+            <a:picLocks noChangeAspect="1" noChangeArrowheads="1"/>
+          </p:cNvPicPr>
+          <p:nvPr/>
+        </p:nvPicPr>
+        <p:blipFill>
+          <a:blip r:embed="rId2" cstate="print">
+            <a:extLst>
+              <a:ext uri="{28A0092B-C50C-407E-A947-70E740481C1C}">
+                <a14:useLocalDpi xmlns:a14="http://schemas.microsoft.com/office/drawing/2010/main" val="0"/>
+              </a:ext>
+            </a:extLst>
+          </a:blip>
+          <a:srcRect/>
+          <a:stretch>
+            <a:fillRect/>
+          </a:stretch>
+        </p:blipFill>
+        <p:spPr bwMode="auto">
+          <a:xfrm>
+            <a:off x="253868" y="219862"/>
+            <a:ext cx="4786718" cy="2962236"/>
+          </a:xfrm>
+          <a:prstGeom prst="rect">
+            <a:avLst/>
+          </a:prstGeom>
+          <a:noFill/>
+          <a:ln>
+            <a:noFill/>
+          </a:ln>
+          <a:effectLst/>
+          <a:extLst>
+            <a:ext uri="{909E8E84-426E-40DD-AFC4-6F175D3DCCD1}">
+              <a14:hiddenFill xmlns:a14="http://schemas.microsoft.com/office/drawing/2010/main">
+                <a:solidFill>
+                  <a:schemeClr val="accent1"/>
+                </a:solidFill>
+              </a14:hiddenFill>
+            </a:ext>
+            <a:ext uri="{91240B29-F687-4F45-9708-019B960494DF}">
+              <a14:hiddenLine xmlns:a14="http://schemas.microsoft.com/office/drawing/2010/main" w="9525">
+                <a:solidFill>
+                  <a:schemeClr val="tx1"/>
+                </a:solidFill>
+                <a:miter lim="800000"/>
+                <a:headEnd/>
+                <a:tailEnd/>
+              </a14:hiddenLine>
+            </a:ext>
+            <a:ext uri="{AF507438-7753-43E0-B8FC-AC1667EBCBE1}">
+              <a14:hiddenEffects xmlns:a14="http://schemas.microsoft.com/office/drawing/2010/main">
+                <a:effectLst>
+                  <a:outerShdw dist="35921" dir="2700000" algn="ctr" rotWithShape="0">
+                    <a:schemeClr val="bg2"/>
+                  </a:outerShdw>
+                </a:effectLst>
+              </a14:hiddenEffects>
+            </a:ext>
+          </a:extLst>
+        </p:spPr>
+      </p:pic>
+      <p:sp>
+        <p:nvSpPr>
+          <p:cNvPr id="2" name="Rectangle 1"/>
+          <p:cNvSpPr/>
+          <p:nvPr/>
+        </p:nvSpPr>
+        <p:spPr>
+          <a:xfrm>
+            <a:off x="576089" y="901725"/>
+            <a:ext cx="1676303" cy="664493"/>
+          </a:xfrm>
+          <a:prstGeom prst="rect">
+            <a:avLst/>
+          </a:prstGeom>
+          <a:solidFill>
+            <a:schemeClr val="bg1"/>
+          </a:solidFill>
+          <a:ln>
+            <a:solidFill>
+              <a:schemeClr val="bg1"/>
+            </a:solidFill>
+          </a:ln>
+        </p:spPr>
+        <p:style>
+          <a:lnRef idx="2">
+            <a:schemeClr val="accent1">
+              <a:shade val="50000"/>
+            </a:schemeClr>
+          </a:lnRef>
+          <a:fillRef idx="1">
+            <a:schemeClr val="accent1"/>
+          </a:fillRef>
+          <a:effectRef idx="0">
+            <a:schemeClr val="accent1"/>
+          </a:effectRef>
+          <a:fontRef idx="minor">
+            <a:schemeClr val="lt1"/>
+          </a:fontRef>
+        </p:style>
+        <p:txBody>
+          <a:bodyPr rtlCol="0" anchor="ctr"/>
+          <a:lstStyle/>
+          <a:p>
+            <a:pPr algn="ctr"/>
+            <a:endParaRPr lang="fr-FR"/>
+          </a:p>
+        </p:txBody>
+      </p:sp>
+      <p:sp>
+        <p:nvSpPr>
+          <p:cNvPr id="49" name="ZoneTexte 48"/>
+          <p:cNvSpPr txBox="1"/>
+          <p:nvPr/>
+        </p:nvSpPr>
+        <p:spPr>
+          <a:xfrm>
+            <a:off x="405102" y="980208"/>
+            <a:ext cx="2089033" cy="461665"/>
+          </a:xfrm>
+          <a:prstGeom prst="rect">
+            <a:avLst/>
+          </a:prstGeom>
+          <a:noFill/>
+        </p:spPr>
+        <p:txBody>
+          <a:bodyPr wrap="none" rtlCol="0">
+            <a:spAutoFit/>
+          </a:bodyPr>
+          <a:lstStyle/>
+          <a:p>
+            <a:pPr algn="ctr"/>
+            <a:r>
+              <a:rPr lang="fr-FR" sz="2400" dirty="0" smtClean="0">
+                <a:latin typeface="Times New Roman" panose="02020603050405020304" pitchFamily="18" charset="0"/>
+                <a:cs typeface="Times New Roman" panose="02020603050405020304" pitchFamily="18" charset="0"/>
+              </a:rPr>
+              <a:t>Pulse </a:t>
+            </a:r>
+            <a:r>
+              <a:rPr lang="fr-FR" sz="2400" dirty="0" err="1" smtClean="0">
+                <a:latin typeface="Times New Roman" panose="02020603050405020304" pitchFamily="18" charset="0"/>
+                <a:cs typeface="Times New Roman" panose="02020603050405020304" pitchFamily="18" charset="0"/>
+              </a:rPr>
+              <a:t>generator</a:t>
+            </a:r>
+            <a:endParaRPr lang="fr-FR" sz="2400" dirty="0">
+              <a:latin typeface="Times New Roman" panose="02020603050405020304" pitchFamily="18" charset="0"/>
+              <a:cs typeface="Times New Roman" panose="02020603050405020304" pitchFamily="18" charset="0"/>
+            </a:endParaRPr>
+          </a:p>
+        </p:txBody>
+      </p:sp>
+      <p:cxnSp>
+        <p:nvCxnSpPr>
+          <p:cNvPr id="4" name="Connecteur droit 3"/>
+          <p:cNvCxnSpPr/>
+          <p:nvPr/>
+        </p:nvCxnSpPr>
+        <p:spPr>
+          <a:xfrm>
+            <a:off x="3885951" y="2810722"/>
+            <a:ext cx="0" cy="600518"/>
+          </a:xfrm>
+          <a:prstGeom prst="line">
+            <a:avLst/>
+          </a:prstGeom>
+          <a:ln>
+            <a:solidFill>
+              <a:schemeClr val="tx1"/>
+            </a:solidFill>
+          </a:ln>
+        </p:spPr>
+        <p:style>
+          <a:lnRef idx="1">
+            <a:schemeClr val="accent1"/>
+          </a:lnRef>
+          <a:fillRef idx="0">
+            <a:schemeClr val="accent1"/>
+          </a:fillRef>
+          <a:effectRef idx="0">
+            <a:schemeClr val="accent1"/>
+          </a:effectRef>
+          <a:fontRef idx="minor">
+            <a:schemeClr val="tx1"/>
+          </a:fontRef>
+        </p:style>
+      </p:cxnSp>
+      <p:cxnSp>
+        <p:nvCxnSpPr>
+          <p:cNvPr id="6" name="Connecteur droit 5"/>
+          <p:cNvCxnSpPr/>
+          <p:nvPr/>
+        </p:nvCxnSpPr>
+        <p:spPr>
+          <a:xfrm>
+            <a:off x="3885951" y="3411240"/>
+            <a:ext cx="1442666" cy="0"/>
+          </a:xfrm>
+          <a:prstGeom prst="line">
+            <a:avLst/>
+          </a:prstGeom>
+          <a:ln>
+            <a:solidFill>
+              <a:schemeClr val="tx1"/>
+            </a:solidFill>
+          </a:ln>
+        </p:spPr>
+        <p:style>
+          <a:lnRef idx="1">
+            <a:schemeClr val="accent1"/>
+          </a:lnRef>
+          <a:fillRef idx="0">
+            <a:schemeClr val="accent1"/>
+          </a:fillRef>
+          <a:effectRef idx="0">
+            <a:schemeClr val="accent1"/>
+          </a:effectRef>
+          <a:fontRef idx="minor">
+            <a:schemeClr val="tx1"/>
+          </a:fontRef>
+        </p:style>
+      </p:cxnSp>
+      <p:cxnSp>
+        <p:nvCxnSpPr>
+          <p:cNvPr id="8" name="Connecteur droit 7"/>
+          <p:cNvCxnSpPr/>
+          <p:nvPr/>
+        </p:nvCxnSpPr>
+        <p:spPr>
+          <a:xfrm flipV="1">
+            <a:off x="5328617" y="3002938"/>
+            <a:ext cx="0" cy="408303"/>
+          </a:xfrm>
+          <a:prstGeom prst="line">
+            <a:avLst/>
+          </a:prstGeom>
+          <a:ln>
+            <a:solidFill>
+              <a:schemeClr val="tx1"/>
+            </a:solidFill>
+          </a:ln>
+        </p:spPr>
+        <p:style>
+          <a:lnRef idx="1">
+            <a:schemeClr val="accent1"/>
+          </a:lnRef>
+          <a:fillRef idx="0">
+            <a:schemeClr val="accent1"/>
+          </a:fillRef>
+          <a:effectRef idx="0">
+            <a:schemeClr val="accent1"/>
+          </a:effectRef>
+          <a:fontRef idx="minor">
+            <a:schemeClr val="tx1"/>
+          </a:fontRef>
+        </p:style>
+      </p:cxnSp>
+      <p:cxnSp>
+        <p:nvCxnSpPr>
+          <p:cNvPr id="10" name="Connecteur droit 9"/>
+          <p:cNvCxnSpPr>
+            <a:endCxn id="575" idx="2"/>
+          </p:cNvCxnSpPr>
+          <p:nvPr/>
+        </p:nvCxnSpPr>
+        <p:spPr>
+          <a:xfrm>
+            <a:off x="6314313" y="3002938"/>
+            <a:ext cx="0" cy="0"/>
+          </a:xfrm>
+          <a:prstGeom prst="line">
+            <a:avLst/>
+          </a:prstGeom>
+        </p:spPr>
+        <p:style>
+          <a:lnRef idx="1">
+            <a:schemeClr val="accent1"/>
+          </a:lnRef>
+          <a:fillRef idx="0">
+            <a:schemeClr val="accent1"/>
+          </a:fillRef>
+          <a:effectRef idx="0">
+            <a:schemeClr val="accent1"/>
+          </a:effectRef>
+          <a:fontRef idx="minor">
+            <a:schemeClr val="tx1"/>
+          </a:fontRef>
+        </p:style>
+      </p:cxnSp>
+      <p:cxnSp>
+        <p:nvCxnSpPr>
+          <p:cNvPr id="14" name="Connecteur droit 13"/>
+          <p:cNvCxnSpPr>
+            <a:stCxn id="575" idx="2"/>
+          </p:cNvCxnSpPr>
+          <p:nvPr/>
+        </p:nvCxnSpPr>
+        <p:spPr>
+          <a:xfrm flipH="1">
+            <a:off x="5328617" y="3002938"/>
+            <a:ext cx="985696" cy="0"/>
+          </a:xfrm>
+          <a:prstGeom prst="line">
+            <a:avLst/>
+          </a:prstGeom>
+          <a:ln>
+            <a:solidFill>
+              <a:schemeClr val="tx1"/>
+            </a:solidFill>
+          </a:ln>
+        </p:spPr>
+        <p:style>
+          <a:lnRef idx="1">
+            <a:schemeClr val="accent1"/>
+          </a:lnRef>
+          <a:fillRef idx="0">
+            <a:schemeClr val="accent1"/>
+          </a:fillRef>
+          <a:effectRef idx="0">
+            <a:schemeClr val="accent1"/>
+          </a:effectRef>
+          <a:fontRef idx="minor">
+            <a:schemeClr val="tx1"/>
+          </a:fontRef>
+        </p:style>
+      </p:cxnSp>
+      <p:cxnSp>
+        <p:nvCxnSpPr>
+          <p:cNvPr id="63" name="Connecteur droit 62"/>
+          <p:cNvCxnSpPr/>
+          <p:nvPr/>
+        </p:nvCxnSpPr>
+        <p:spPr>
+          <a:xfrm>
+            <a:off x="3661200" y="2810723"/>
+            <a:ext cx="0" cy="1995855"/>
+          </a:xfrm>
+          <a:prstGeom prst="line">
+            <a:avLst/>
+          </a:prstGeom>
+          <a:ln>
+            <a:solidFill>
+              <a:schemeClr val="tx1"/>
+            </a:solidFill>
+          </a:ln>
+        </p:spPr>
+        <p:style>
+          <a:lnRef idx="1">
+            <a:schemeClr val="accent1"/>
+          </a:lnRef>
+          <a:fillRef idx="0">
+            <a:schemeClr val="accent1"/>
+          </a:fillRef>
+          <a:effectRef idx="0">
+            <a:schemeClr val="accent1"/>
+          </a:effectRef>
+          <a:fontRef idx="minor">
+            <a:schemeClr val="tx1"/>
+          </a:fontRef>
+        </p:style>
+      </p:cxnSp>
+      <p:cxnSp>
+        <p:nvCxnSpPr>
+          <p:cNvPr id="65" name="Connecteur droit 64"/>
+          <p:cNvCxnSpPr/>
+          <p:nvPr/>
+        </p:nvCxnSpPr>
+        <p:spPr>
+          <a:xfrm>
+            <a:off x="3144203" y="4806578"/>
+            <a:ext cx="516997" cy="0"/>
+          </a:xfrm>
+          <a:prstGeom prst="line">
+            <a:avLst/>
+          </a:prstGeom>
+          <a:ln>
+            <a:solidFill>
+              <a:schemeClr val="tx1"/>
+            </a:solidFill>
+          </a:ln>
+        </p:spPr>
+        <p:style>
+          <a:lnRef idx="1">
+            <a:schemeClr val="accent1"/>
+          </a:lnRef>
+          <a:fillRef idx="0">
+            <a:schemeClr val="accent1"/>
+          </a:fillRef>
+          <a:effectRef idx="0">
+            <a:schemeClr val="accent1"/>
+          </a:effectRef>
+          <a:fontRef idx="minor">
+            <a:schemeClr val="tx1"/>
+          </a:fontRef>
+        </p:style>
+      </p:cxnSp>
+      <p:cxnSp>
+        <p:nvCxnSpPr>
+          <p:cNvPr id="22" name="Connecteur droit 21"/>
+          <p:cNvCxnSpPr/>
+          <p:nvPr/>
+        </p:nvCxnSpPr>
+        <p:spPr>
+          <a:xfrm flipV="1">
+            <a:off x="36000" y="4512002"/>
+            <a:ext cx="0" cy="5839192"/>
+          </a:xfrm>
+          <a:prstGeom prst="line">
+            <a:avLst/>
+          </a:prstGeom>
+          <a:ln>
+            <a:solidFill>
+              <a:schemeClr val="tx1"/>
+            </a:solidFill>
+          </a:ln>
+        </p:spPr>
+        <p:style>
+          <a:lnRef idx="1">
+            <a:schemeClr val="accent1"/>
+          </a:lnRef>
+          <a:fillRef idx="0">
+            <a:schemeClr val="accent1"/>
+          </a:fillRef>
+          <a:effectRef idx="0">
+            <a:schemeClr val="accent1"/>
+          </a:effectRef>
+          <a:fontRef idx="minor">
+            <a:schemeClr val="tx1"/>
+          </a:fontRef>
+        </p:style>
+      </p:cxnSp>
+      <p:cxnSp>
+        <p:nvCxnSpPr>
+          <p:cNvPr id="75" name="Connecteur droit 74"/>
+          <p:cNvCxnSpPr/>
+          <p:nvPr/>
+        </p:nvCxnSpPr>
+        <p:spPr>
+          <a:xfrm rot="5400000">
+            <a:off x="8532973" y="6606618"/>
+            <a:ext cx="792088" cy="0"/>
+          </a:xfrm>
+          <a:prstGeom prst="line">
+            <a:avLst/>
+          </a:prstGeom>
+          <a:ln w="38100">
+            <a:solidFill>
+              <a:schemeClr val="bg1">
+                <a:lumMod val="50000"/>
+              </a:schemeClr>
+            </a:solidFill>
+          </a:ln>
+        </p:spPr>
+        <p:style>
+          <a:lnRef idx="1">
+            <a:schemeClr val="accent1"/>
+          </a:lnRef>
+          <a:fillRef idx="0">
+            <a:schemeClr val="accent1"/>
+          </a:fillRef>
+          <a:effectRef idx="0">
+            <a:schemeClr val="accent1"/>
+          </a:effectRef>
+          <a:fontRef idx="minor">
+            <a:schemeClr val="tx1"/>
+          </a:fontRef>
+        </p:style>
+      </p:cxnSp>
+      <p:sp>
+        <p:nvSpPr>
+          <p:cNvPr id="76" name="ZoneTexte 75"/>
+          <p:cNvSpPr txBox="1"/>
+          <p:nvPr/>
+        </p:nvSpPr>
+        <p:spPr>
+          <a:xfrm>
+            <a:off x="8642720" y="6994400"/>
+            <a:ext cx="572594" cy="461665"/>
+          </a:xfrm>
+          <a:prstGeom prst="rect">
+            <a:avLst/>
+          </a:prstGeom>
+          <a:noFill/>
+        </p:spPr>
+        <p:txBody>
+          <a:bodyPr wrap="none" rtlCol="0">
+            <a:spAutoFit/>
+          </a:bodyPr>
+          <a:lstStyle/>
+          <a:p>
+            <a:pPr algn="ctr"/>
+            <a:r>
+              <a:rPr lang="el-GR" sz="2400" dirty="0" smtClean="0">
+                <a:latin typeface="Times New Roman" panose="02020603050405020304" pitchFamily="18" charset="0"/>
+                <a:cs typeface="Times New Roman" panose="02020603050405020304" pitchFamily="18" charset="0"/>
+              </a:rPr>
+              <a:t>λ</a:t>
+            </a:r>
+            <a:r>
+              <a:rPr lang="fr-FR" sz="2400" dirty="0" smtClean="0">
+                <a:latin typeface="Times New Roman" panose="02020603050405020304" pitchFamily="18" charset="0"/>
+                <a:cs typeface="Times New Roman" panose="02020603050405020304" pitchFamily="18" charset="0"/>
+              </a:rPr>
+              <a:t>/4</a:t>
+            </a:r>
+            <a:endParaRPr lang="fr-FR" sz="2400" dirty="0">
+              <a:latin typeface="Times New Roman" panose="02020603050405020304" pitchFamily="18" charset="0"/>
+              <a:cs typeface="Times New Roman" panose="02020603050405020304" pitchFamily="18" charset="0"/>
+            </a:endParaRPr>
+          </a:p>
+        </p:txBody>
+      </p:sp>
+      <p:pic>
+        <p:nvPicPr>
+          <p:cNvPr id="1027" name="Picture 3"/>
+          <p:cNvPicPr>
+            <a:picLocks noChangeAspect="1" noChangeArrowheads="1"/>
+          </p:cNvPicPr>
+          <p:nvPr/>
+        </p:nvPicPr>
+        <p:blipFill>
+          <a:blip r:embed="rId3" cstate="print">
+            <a:extLst>
+              <a:ext uri="{28A0092B-C50C-407E-A947-70E740481C1C}">
+                <a14:useLocalDpi xmlns:a14="http://schemas.microsoft.com/office/drawing/2010/main" val="0"/>
+              </a:ext>
+            </a:extLst>
+          </a:blip>
+          <a:srcRect/>
+          <a:stretch>
+            <a:fillRect/>
+          </a:stretch>
+        </p:blipFill>
+        <p:spPr bwMode="auto">
+          <a:xfrm>
+            <a:off x="1070711" y="8337079"/>
+            <a:ext cx="4094364" cy="1599923"/>
+          </a:xfrm>
+          <a:prstGeom prst="rect">
+            <a:avLst/>
+          </a:prstGeom>
+          <a:noFill/>
+          <a:ln>
+            <a:noFill/>
+          </a:ln>
+          <a:effectLst/>
+          <a:extLst>
+            <a:ext uri="{909E8E84-426E-40DD-AFC4-6F175D3DCCD1}">
+              <a14:hiddenFill xmlns:a14="http://schemas.microsoft.com/office/drawing/2010/main">
+                <a:solidFill>
+                  <a:schemeClr val="accent1"/>
+                </a:solidFill>
+              </a14:hiddenFill>
+            </a:ext>
+            <a:ext uri="{91240B29-F687-4F45-9708-019B960494DF}">
+              <a14:hiddenLine xmlns:a14="http://schemas.microsoft.com/office/drawing/2010/main" w="9525">
+                <a:solidFill>
+                  <a:schemeClr val="tx1"/>
+                </a:solidFill>
+                <a:miter lim="800000"/>
+                <a:headEnd/>
+                <a:tailEnd/>
+              </a14:hiddenLine>
+            </a:ext>
+            <a:ext uri="{AF507438-7753-43E0-B8FC-AC1667EBCBE1}">
+              <a14:hiddenEffects xmlns:a14="http://schemas.microsoft.com/office/drawing/2010/main">
+                <a:effectLst>
+                  <a:outerShdw dist="35921" dir="2700000" algn="ctr" rotWithShape="0">
+                    <a:schemeClr val="bg2"/>
+                  </a:outerShdw>
+                </a:effectLst>
+              </a14:hiddenEffects>
+            </a:ext>
+          </a:extLst>
+        </p:spPr>
+      </p:pic>
+      <p:sp>
+        <p:nvSpPr>
+          <p:cNvPr id="78" name="ZoneTexte 77"/>
+          <p:cNvSpPr txBox="1"/>
+          <p:nvPr/>
+        </p:nvSpPr>
+        <p:spPr>
+          <a:xfrm>
+            <a:off x="1224161" y="8533829"/>
+            <a:ext cx="3177858" cy="830997"/>
+          </a:xfrm>
+          <a:prstGeom prst="rect">
+            <a:avLst/>
+          </a:prstGeom>
+          <a:solidFill>
+            <a:schemeClr val="bg1"/>
+          </a:solidFill>
+        </p:spPr>
+        <p:txBody>
+          <a:bodyPr wrap="none" rtlCol="0">
+            <a:spAutoFit/>
+          </a:bodyPr>
+          <a:lstStyle/>
+          <a:p>
+            <a:pPr algn="ctr"/>
+            <a:r>
+              <a:rPr lang="fr-FR" sz="2400" dirty="0" smtClean="0">
+                <a:latin typeface="Times New Roman" panose="02020603050405020304" pitchFamily="18" charset="0"/>
+                <a:cs typeface="Times New Roman" panose="02020603050405020304" pitchFamily="18" charset="0"/>
+              </a:rPr>
+              <a:t>Time </a:t>
+            </a:r>
+            <a:r>
+              <a:rPr lang="fr-FR" sz="2400" dirty="0" err="1" smtClean="0">
+                <a:latin typeface="Times New Roman" panose="02020603050405020304" pitchFamily="18" charset="0"/>
+                <a:cs typeface="Times New Roman" panose="02020603050405020304" pitchFamily="18" charset="0"/>
+              </a:rPr>
+              <a:t>correlated</a:t>
+            </a:r>
+            <a:r>
+              <a:rPr lang="fr-FR" sz="2400" dirty="0" smtClean="0">
+                <a:latin typeface="Times New Roman" panose="02020603050405020304" pitchFamily="18" charset="0"/>
+                <a:cs typeface="Times New Roman" panose="02020603050405020304" pitchFamily="18" charset="0"/>
+              </a:rPr>
+              <a:t> photons</a:t>
+            </a:r>
+          </a:p>
+          <a:p>
+            <a:r>
+              <a:rPr lang="fr-FR" sz="2400" dirty="0" err="1">
+                <a:latin typeface="Times New Roman" panose="02020603050405020304" pitchFamily="18" charset="0"/>
+                <a:cs typeface="Times New Roman" panose="02020603050405020304" pitchFamily="18" charset="0"/>
+              </a:rPr>
+              <a:t>c</a:t>
+            </a:r>
+            <a:r>
+              <a:rPr lang="fr-FR" sz="2400" dirty="0" err="1" smtClean="0">
+                <a:latin typeface="Times New Roman" panose="02020603050405020304" pitchFamily="18" charset="0"/>
+                <a:cs typeface="Times New Roman" panose="02020603050405020304" pitchFamily="18" charset="0"/>
+              </a:rPr>
+              <a:t>ounting</a:t>
+            </a:r>
+            <a:r>
+              <a:rPr lang="fr-FR" sz="2400" dirty="0" smtClean="0">
+                <a:latin typeface="Times New Roman" panose="02020603050405020304" pitchFamily="18" charset="0"/>
+                <a:cs typeface="Times New Roman" panose="02020603050405020304" pitchFamily="18" charset="0"/>
+              </a:rPr>
+              <a:t> unit</a:t>
+            </a:r>
+            <a:endParaRPr lang="fr-FR" sz="2400" dirty="0">
+              <a:latin typeface="Times New Roman" panose="02020603050405020304" pitchFamily="18" charset="0"/>
+              <a:cs typeface="Times New Roman" panose="02020603050405020304" pitchFamily="18" charset="0"/>
+            </a:endParaRPr>
+          </a:p>
+        </p:txBody>
+      </p:sp>
+      <p:cxnSp>
+        <p:nvCxnSpPr>
+          <p:cNvPr id="79" name="Connecteur droit 78"/>
+          <p:cNvCxnSpPr/>
+          <p:nvPr/>
+        </p:nvCxnSpPr>
+        <p:spPr>
+          <a:xfrm>
+            <a:off x="3420000" y="2807029"/>
+            <a:ext cx="0" cy="1711517"/>
+          </a:xfrm>
+          <a:prstGeom prst="line">
+            <a:avLst/>
+          </a:prstGeom>
+          <a:ln>
+            <a:solidFill>
+              <a:schemeClr val="tx1"/>
+            </a:solidFill>
+          </a:ln>
+        </p:spPr>
+        <p:style>
+          <a:lnRef idx="1">
+            <a:schemeClr val="accent1"/>
+          </a:lnRef>
+          <a:fillRef idx="0">
+            <a:schemeClr val="accent1"/>
+          </a:fillRef>
+          <a:effectRef idx="0">
+            <a:schemeClr val="accent1"/>
+          </a:effectRef>
+          <a:fontRef idx="minor">
+            <a:schemeClr val="tx1"/>
+          </a:fontRef>
+        </p:style>
+      </p:cxnSp>
+      <p:cxnSp>
+        <p:nvCxnSpPr>
+          <p:cNvPr id="81" name="Connecteur droit 80"/>
+          <p:cNvCxnSpPr/>
+          <p:nvPr/>
+        </p:nvCxnSpPr>
+        <p:spPr>
+          <a:xfrm>
+            <a:off x="36000" y="4518546"/>
+            <a:ext cx="3384000" cy="0"/>
+          </a:xfrm>
+          <a:prstGeom prst="line">
+            <a:avLst/>
+          </a:prstGeom>
+          <a:ln>
+            <a:solidFill>
+              <a:schemeClr val="tx1"/>
+            </a:solidFill>
+          </a:ln>
+        </p:spPr>
+        <p:style>
+          <a:lnRef idx="1">
+            <a:schemeClr val="accent1"/>
+          </a:lnRef>
+          <a:fillRef idx="0">
+            <a:schemeClr val="accent1"/>
+          </a:fillRef>
+          <a:effectRef idx="0">
+            <a:schemeClr val="accent1"/>
+          </a:effectRef>
+          <a:fontRef idx="minor">
+            <a:schemeClr val="tx1"/>
+          </a:fontRef>
+        </p:style>
+      </p:cxnSp>
+      <p:cxnSp>
+        <p:nvCxnSpPr>
+          <p:cNvPr id="31" name="Connecteur droit 30"/>
+          <p:cNvCxnSpPr>
+            <a:stCxn id="567" idx="0"/>
+          </p:cNvCxnSpPr>
+          <p:nvPr/>
+        </p:nvCxnSpPr>
+        <p:spPr>
+          <a:xfrm flipH="1" flipV="1">
+            <a:off x="3138849" y="4806578"/>
+            <a:ext cx="5354" cy="1365609"/>
+          </a:xfrm>
+          <a:prstGeom prst="line">
+            <a:avLst/>
+          </a:prstGeom>
+          <a:ln>
+            <a:solidFill>
+              <a:schemeClr val="tx1"/>
+            </a:solidFill>
+          </a:ln>
+        </p:spPr>
+        <p:style>
+          <a:lnRef idx="1">
+            <a:schemeClr val="accent1"/>
+          </a:lnRef>
+          <a:fillRef idx="0">
+            <a:schemeClr val="accent1"/>
+          </a:fillRef>
+          <a:effectRef idx="0">
+            <a:schemeClr val="accent1"/>
+          </a:effectRef>
+          <a:fontRef idx="minor">
+            <a:schemeClr val="tx1"/>
+          </a:fontRef>
+        </p:style>
+      </p:cxnSp>
+      <p:cxnSp>
+        <p:nvCxnSpPr>
+          <p:cNvPr id="89" name="Connecteur droit 88"/>
+          <p:cNvCxnSpPr/>
+          <p:nvPr/>
+        </p:nvCxnSpPr>
+        <p:spPr>
+          <a:xfrm>
+            <a:off x="45023" y="10345365"/>
+            <a:ext cx="4116702" cy="0"/>
+          </a:xfrm>
+          <a:prstGeom prst="line">
+            <a:avLst/>
+          </a:prstGeom>
+          <a:ln>
+            <a:solidFill>
+              <a:schemeClr val="tx1"/>
+            </a:solidFill>
+          </a:ln>
+        </p:spPr>
+        <p:style>
+          <a:lnRef idx="1">
+            <a:schemeClr val="accent1"/>
+          </a:lnRef>
+          <a:fillRef idx="0">
+            <a:schemeClr val="accent1"/>
+          </a:fillRef>
+          <a:effectRef idx="0">
+            <a:schemeClr val="accent1"/>
+          </a:effectRef>
+          <a:fontRef idx="minor">
+            <a:schemeClr val="tx1"/>
+          </a:fontRef>
+        </p:style>
+      </p:cxnSp>
+      <p:cxnSp>
+        <p:nvCxnSpPr>
+          <p:cNvPr id="90" name="Connecteur droit 89"/>
+          <p:cNvCxnSpPr/>
+          <p:nvPr/>
+        </p:nvCxnSpPr>
+        <p:spPr>
+          <a:xfrm flipV="1">
+            <a:off x="4161725" y="9507200"/>
+            <a:ext cx="0" cy="843994"/>
+          </a:xfrm>
+          <a:prstGeom prst="line">
+            <a:avLst/>
+          </a:prstGeom>
+          <a:ln>
+            <a:solidFill>
+              <a:schemeClr val="tx1"/>
+            </a:solidFill>
+          </a:ln>
+        </p:spPr>
+        <p:style>
+          <a:lnRef idx="1">
+            <a:schemeClr val="accent1"/>
+          </a:lnRef>
+          <a:fillRef idx="0">
+            <a:schemeClr val="accent1"/>
+          </a:fillRef>
+          <a:effectRef idx="0">
+            <a:schemeClr val="accent1"/>
+          </a:effectRef>
+          <a:fontRef idx="minor">
+            <a:schemeClr val="tx1"/>
+          </a:fontRef>
+        </p:style>
+      </p:cxnSp>
+      <p:cxnSp>
+        <p:nvCxnSpPr>
+          <p:cNvPr id="94" name="Connecteur droit 93"/>
+          <p:cNvCxnSpPr/>
+          <p:nvPr/>
+        </p:nvCxnSpPr>
+        <p:spPr>
+          <a:xfrm flipV="1">
+            <a:off x="4351525" y="9515005"/>
+            <a:ext cx="0" cy="843994"/>
+          </a:xfrm>
+          <a:prstGeom prst="line">
+            <a:avLst/>
+          </a:prstGeom>
+          <a:ln>
+            <a:solidFill>
+              <a:schemeClr val="tx1"/>
+            </a:solidFill>
+          </a:ln>
+        </p:spPr>
+        <p:style>
+          <a:lnRef idx="1">
+            <a:schemeClr val="accent1"/>
+          </a:lnRef>
+          <a:fillRef idx="0">
+            <a:schemeClr val="accent1"/>
+          </a:fillRef>
+          <a:effectRef idx="0">
+            <a:schemeClr val="accent1"/>
+          </a:effectRef>
+          <a:fontRef idx="minor">
+            <a:schemeClr val="tx1"/>
+          </a:fontRef>
+        </p:style>
+      </p:cxnSp>
+      <p:cxnSp>
+        <p:nvCxnSpPr>
+          <p:cNvPr id="97" name="Connecteur droit 96"/>
+          <p:cNvCxnSpPr/>
+          <p:nvPr/>
+        </p:nvCxnSpPr>
+        <p:spPr>
+          <a:xfrm>
+            <a:off x="6676678" y="3300439"/>
+            <a:ext cx="0" cy="2082203"/>
+          </a:xfrm>
+          <a:prstGeom prst="line">
+            <a:avLst/>
+          </a:prstGeom>
+          <a:ln w="28575">
+            <a:solidFill>
+              <a:schemeClr val="accent6"/>
+            </a:solidFill>
+            <a:prstDash val="dash"/>
+            <a:tailEnd type="arrow"/>
+          </a:ln>
+        </p:spPr>
+        <p:style>
+          <a:lnRef idx="1">
+            <a:schemeClr val="accent1"/>
+          </a:lnRef>
+          <a:fillRef idx="0">
+            <a:schemeClr val="accent1"/>
+          </a:fillRef>
+          <a:effectRef idx="0">
+            <a:schemeClr val="accent1"/>
+          </a:effectRef>
+          <a:fontRef idx="minor">
+            <a:schemeClr val="tx1"/>
+          </a:fontRef>
+        </p:style>
+      </p:cxnSp>
+      <p:cxnSp>
+        <p:nvCxnSpPr>
+          <p:cNvPr id="103" name="Connecteur droit 102"/>
+          <p:cNvCxnSpPr/>
+          <p:nvPr/>
+        </p:nvCxnSpPr>
+        <p:spPr>
+          <a:xfrm>
+            <a:off x="3350115" y="6593422"/>
+            <a:ext cx="1978502" cy="0"/>
+          </a:xfrm>
+          <a:prstGeom prst="line">
+            <a:avLst/>
+          </a:prstGeom>
+          <a:ln w="28575">
+            <a:solidFill>
+              <a:srgbClr val="FF0000"/>
+            </a:solidFill>
+            <a:prstDash val="dash"/>
+            <a:tailEnd type="arrow"/>
+          </a:ln>
+        </p:spPr>
+        <p:style>
+          <a:lnRef idx="1">
+            <a:schemeClr val="accent1"/>
+          </a:lnRef>
+          <a:fillRef idx="0">
+            <a:schemeClr val="accent1"/>
+          </a:fillRef>
+          <a:effectRef idx="0">
+            <a:schemeClr val="accent1"/>
+          </a:effectRef>
+          <a:fontRef idx="minor">
+            <a:schemeClr val="tx1"/>
+          </a:fontRef>
+        </p:style>
+      </p:cxnSp>
+      <p:cxnSp>
+        <p:nvCxnSpPr>
+          <p:cNvPr id="108" name="Connecteur droit 107"/>
+          <p:cNvCxnSpPr/>
+          <p:nvPr/>
+        </p:nvCxnSpPr>
+        <p:spPr>
+          <a:xfrm flipV="1">
+            <a:off x="9073033" y="6621574"/>
+            <a:ext cx="1291759" cy="9866"/>
+          </a:xfrm>
+          <a:prstGeom prst="line">
+            <a:avLst/>
+          </a:prstGeom>
+          <a:ln w="28575">
+            <a:solidFill>
+              <a:srgbClr val="C00000"/>
+            </a:solidFill>
+            <a:headEnd type="arrow"/>
+          </a:ln>
+        </p:spPr>
+        <p:style>
+          <a:lnRef idx="1">
+            <a:schemeClr val="accent1"/>
+          </a:lnRef>
+          <a:fillRef idx="0">
+            <a:schemeClr val="accent1"/>
+          </a:fillRef>
+          <a:effectRef idx="0">
+            <a:schemeClr val="accent1"/>
+          </a:effectRef>
+          <a:fontRef idx="minor">
+            <a:schemeClr val="tx1"/>
+          </a:fontRef>
+        </p:style>
+      </p:cxnSp>
+      <p:sp>
+        <p:nvSpPr>
+          <p:cNvPr id="119" name="ZoneTexte 118"/>
+          <p:cNvSpPr txBox="1"/>
+          <p:nvPr/>
+        </p:nvSpPr>
+        <p:spPr>
+          <a:xfrm>
+            <a:off x="8831856" y="7456065"/>
+            <a:ext cx="572594" cy="461665"/>
+          </a:xfrm>
+          <a:prstGeom prst="rect">
+            <a:avLst/>
+          </a:prstGeom>
+          <a:noFill/>
+        </p:spPr>
+        <p:txBody>
+          <a:bodyPr wrap="none" rtlCol="0">
+            <a:spAutoFit/>
+          </a:bodyPr>
+          <a:lstStyle/>
+          <a:p>
+            <a:pPr algn="ctr"/>
+            <a:r>
+              <a:rPr lang="el-GR" sz="2400" dirty="0" smtClean="0">
+                <a:latin typeface="Times New Roman" panose="02020603050405020304" pitchFamily="18" charset="0"/>
+                <a:cs typeface="Times New Roman" panose="02020603050405020304" pitchFamily="18" charset="0"/>
+              </a:rPr>
+              <a:t>λ</a:t>
+            </a:r>
+            <a:r>
+              <a:rPr lang="fr-FR" sz="2400" dirty="0" smtClean="0">
+                <a:latin typeface="Times New Roman" panose="02020603050405020304" pitchFamily="18" charset="0"/>
+                <a:cs typeface="Times New Roman" panose="02020603050405020304" pitchFamily="18" charset="0"/>
+              </a:rPr>
+              <a:t>/2</a:t>
+            </a:r>
+            <a:endParaRPr lang="fr-FR" sz="2400" dirty="0">
+              <a:latin typeface="Times New Roman" panose="02020603050405020304" pitchFamily="18" charset="0"/>
+              <a:cs typeface="Times New Roman" panose="02020603050405020304" pitchFamily="18" charset="0"/>
+            </a:endParaRPr>
+          </a:p>
+        </p:txBody>
+      </p:sp>
+      <p:sp>
+        <p:nvSpPr>
+          <p:cNvPr id="53" name="Ellipse 52"/>
+          <p:cNvSpPr/>
+          <p:nvPr/>
+        </p:nvSpPr>
+        <p:spPr>
+          <a:xfrm>
+            <a:off x="6270173" y="10178979"/>
+            <a:ext cx="283600" cy="360040"/>
+          </a:xfrm>
+          <a:prstGeom prst="ellipse">
+            <a:avLst/>
+          </a:prstGeom>
+          <a:solidFill>
+            <a:schemeClr val="tx1"/>
+          </a:solidFill>
+          <a:ln>
+            <a:solidFill>
+              <a:schemeClr val="tx1"/>
+            </a:solidFill>
+          </a:ln>
+        </p:spPr>
+        <p:style>
+          <a:lnRef idx="2">
+            <a:schemeClr val="accent1">
+              <a:shade val="50000"/>
+            </a:schemeClr>
+          </a:lnRef>
+          <a:fillRef idx="1">
+            <a:schemeClr val="accent1"/>
+          </a:fillRef>
+          <a:effectRef idx="0">
+            <a:schemeClr val="accent1"/>
+          </a:effectRef>
+          <a:fontRef idx="minor">
+            <a:schemeClr val="lt1"/>
+          </a:fontRef>
+        </p:style>
+        <p:txBody>
+          <a:bodyPr rtlCol="0" anchor="ctr"/>
+          <a:lstStyle/>
+          <a:p>
+            <a:pPr algn="ctr"/>
+            <a:endParaRPr lang="fr-FR"/>
+          </a:p>
+        </p:txBody>
+      </p:sp>
+      <p:cxnSp>
+        <p:nvCxnSpPr>
+          <p:cNvPr id="121" name="Connecteur droit 120"/>
+          <p:cNvCxnSpPr>
+            <a:endCxn id="53" idx="2"/>
+          </p:cNvCxnSpPr>
+          <p:nvPr/>
+        </p:nvCxnSpPr>
+        <p:spPr>
+          <a:xfrm>
+            <a:off x="4351134" y="10358999"/>
+            <a:ext cx="1919039" cy="0"/>
+          </a:xfrm>
+          <a:prstGeom prst="line">
+            <a:avLst/>
+          </a:prstGeom>
+          <a:ln>
+            <a:solidFill>
+              <a:schemeClr val="tx1"/>
+            </a:solidFill>
+          </a:ln>
+        </p:spPr>
+        <p:style>
+          <a:lnRef idx="1">
+            <a:schemeClr val="accent1"/>
+          </a:lnRef>
+          <a:fillRef idx="0">
+            <a:schemeClr val="accent1"/>
+          </a:fillRef>
+          <a:effectRef idx="0">
+            <a:schemeClr val="accent1"/>
+          </a:effectRef>
+          <a:fontRef idx="minor">
+            <a:schemeClr val="tx1"/>
+          </a:fontRef>
+        </p:style>
+      </p:cxnSp>
+      <p:cxnSp>
+        <p:nvCxnSpPr>
+          <p:cNvPr id="127" name="Connecteur droit 126"/>
+          <p:cNvCxnSpPr/>
+          <p:nvPr/>
+        </p:nvCxnSpPr>
+        <p:spPr>
+          <a:xfrm>
+            <a:off x="4870221" y="6210574"/>
+            <a:ext cx="0" cy="837287"/>
+          </a:xfrm>
+          <a:prstGeom prst="line">
+            <a:avLst/>
+          </a:prstGeom>
+          <a:ln w="28575">
+            <a:solidFill>
+              <a:schemeClr val="tx1"/>
+            </a:solidFill>
+            <a:headEnd type="arrow"/>
+            <a:tailEnd type="arrow"/>
+          </a:ln>
+        </p:spPr>
+        <p:style>
+          <a:lnRef idx="1">
+            <a:schemeClr val="accent1"/>
+          </a:lnRef>
+          <a:fillRef idx="0">
+            <a:schemeClr val="accent1"/>
+          </a:fillRef>
+          <a:effectRef idx="0">
+            <a:schemeClr val="accent1"/>
+          </a:effectRef>
+          <a:fontRef idx="minor">
+            <a:schemeClr val="tx1"/>
+          </a:fontRef>
+        </p:style>
+      </p:cxnSp>
+      <p:cxnSp>
+        <p:nvCxnSpPr>
+          <p:cNvPr id="131" name="Connecteur droit 130"/>
+          <p:cNvCxnSpPr/>
+          <p:nvPr/>
+        </p:nvCxnSpPr>
+        <p:spPr>
+          <a:xfrm rot="5400000">
+            <a:off x="6686277" y="4315927"/>
+            <a:ext cx="0" cy="837287"/>
+          </a:xfrm>
+          <a:prstGeom prst="line">
+            <a:avLst/>
+          </a:prstGeom>
+          <a:ln w="28575">
+            <a:solidFill>
+              <a:schemeClr val="tx1"/>
+            </a:solidFill>
+            <a:headEnd type="arrow"/>
+            <a:tailEnd type="arrow"/>
+          </a:ln>
+        </p:spPr>
+        <p:style>
+          <a:lnRef idx="1">
+            <a:schemeClr val="accent1"/>
+          </a:lnRef>
+          <a:fillRef idx="0">
+            <a:schemeClr val="accent1"/>
+          </a:fillRef>
+          <a:effectRef idx="0">
+            <a:schemeClr val="accent1"/>
+          </a:effectRef>
+          <a:fontRef idx="minor">
+            <a:schemeClr val="tx1"/>
+          </a:fontRef>
+        </p:style>
+      </p:cxnSp>
+      <p:sp>
+        <p:nvSpPr>
+          <p:cNvPr id="133" name="ZoneTexte 132"/>
+          <p:cNvSpPr txBox="1"/>
+          <p:nvPr/>
+        </p:nvSpPr>
+        <p:spPr>
+          <a:xfrm>
+            <a:off x="7069913" y="5272097"/>
+            <a:ext cx="1293944" cy="461665"/>
+          </a:xfrm>
+          <a:prstGeom prst="rect">
+            <a:avLst/>
+          </a:prstGeom>
+          <a:noFill/>
+        </p:spPr>
+        <p:txBody>
+          <a:bodyPr wrap="none" rtlCol="0">
+            <a:spAutoFit/>
+          </a:bodyPr>
+          <a:lstStyle/>
+          <a:p>
+            <a:pPr algn="ctr"/>
+            <a:r>
+              <a:rPr lang="fr-FR" sz="2400" dirty="0" err="1" smtClean="0">
+                <a:latin typeface="Times New Roman" panose="02020603050405020304" pitchFamily="18" charset="0"/>
+                <a:cs typeface="Times New Roman" panose="02020603050405020304" pitchFamily="18" charset="0"/>
+              </a:rPr>
+              <a:t>Polarizer</a:t>
+            </a:r>
+            <a:endParaRPr lang="fr-FR" sz="2400" dirty="0">
+              <a:latin typeface="Times New Roman" panose="02020603050405020304" pitchFamily="18" charset="0"/>
+              <a:cs typeface="Times New Roman" panose="02020603050405020304" pitchFamily="18" charset="0"/>
+            </a:endParaRPr>
+          </a:p>
+        </p:txBody>
+      </p:sp>
+      <p:sp>
+        <p:nvSpPr>
+          <p:cNvPr id="135" name="ZoneTexte 134"/>
+          <p:cNvSpPr txBox="1"/>
+          <p:nvPr/>
+        </p:nvSpPr>
+        <p:spPr>
+          <a:xfrm>
+            <a:off x="5616649" y="5814690"/>
+            <a:ext cx="572594" cy="461665"/>
+          </a:xfrm>
+          <a:prstGeom prst="rect">
+            <a:avLst/>
+          </a:prstGeom>
+          <a:noFill/>
+        </p:spPr>
+        <p:txBody>
+          <a:bodyPr wrap="none" rtlCol="0">
+            <a:spAutoFit/>
+          </a:bodyPr>
+          <a:lstStyle/>
+          <a:p>
+            <a:pPr algn="ctr"/>
+            <a:r>
+              <a:rPr lang="el-GR" sz="2400" dirty="0" smtClean="0">
+                <a:latin typeface="Times New Roman" panose="02020603050405020304" pitchFamily="18" charset="0"/>
+                <a:cs typeface="Times New Roman" panose="02020603050405020304" pitchFamily="18" charset="0"/>
+              </a:rPr>
+              <a:t>λ</a:t>
+            </a:r>
+            <a:r>
+              <a:rPr lang="fr-FR" sz="2400" dirty="0" smtClean="0">
+                <a:latin typeface="Times New Roman" panose="02020603050405020304" pitchFamily="18" charset="0"/>
+                <a:cs typeface="Times New Roman" panose="02020603050405020304" pitchFamily="18" charset="0"/>
+              </a:rPr>
+              <a:t>/4</a:t>
+            </a:r>
+            <a:endParaRPr lang="fr-FR" sz="2400" dirty="0">
+              <a:latin typeface="Times New Roman" panose="02020603050405020304" pitchFamily="18" charset="0"/>
+              <a:cs typeface="Times New Roman" panose="02020603050405020304" pitchFamily="18" charset="0"/>
+            </a:endParaRPr>
+          </a:p>
+        </p:txBody>
+      </p:sp>
+      <p:cxnSp>
+        <p:nvCxnSpPr>
+          <p:cNvPr id="136" name="Connecteur droit 135"/>
+          <p:cNvCxnSpPr/>
+          <p:nvPr/>
+        </p:nvCxnSpPr>
+        <p:spPr>
+          <a:xfrm rot="5400000">
+            <a:off x="5149696" y="6618245"/>
+            <a:ext cx="792088" cy="0"/>
+          </a:xfrm>
+          <a:prstGeom prst="line">
+            <a:avLst/>
+          </a:prstGeom>
+          <a:ln w="38100">
+            <a:solidFill>
+              <a:schemeClr val="bg1">
+                <a:lumMod val="50000"/>
+              </a:schemeClr>
+            </a:solidFill>
+          </a:ln>
+        </p:spPr>
+        <p:style>
+          <a:lnRef idx="1">
+            <a:schemeClr val="accent1"/>
+          </a:lnRef>
+          <a:fillRef idx="0">
+            <a:schemeClr val="accent1"/>
+          </a:fillRef>
+          <a:effectRef idx="0">
+            <a:schemeClr val="accent1"/>
+          </a:effectRef>
+          <a:fontRef idx="minor">
+            <a:schemeClr val="tx1"/>
+          </a:fontRef>
+        </p:style>
+      </p:cxnSp>
+      <p:sp>
+        <p:nvSpPr>
+          <p:cNvPr id="137" name="ZoneTexte 136"/>
+          <p:cNvSpPr txBox="1"/>
+          <p:nvPr/>
+        </p:nvSpPr>
+        <p:spPr>
+          <a:xfrm>
+            <a:off x="4898769" y="7006027"/>
+            <a:ext cx="1293944" cy="461665"/>
+          </a:xfrm>
+          <a:prstGeom prst="rect">
+            <a:avLst/>
+          </a:prstGeom>
+          <a:noFill/>
+        </p:spPr>
+        <p:txBody>
+          <a:bodyPr wrap="none" rtlCol="0">
+            <a:spAutoFit/>
+          </a:bodyPr>
+          <a:lstStyle/>
+          <a:p>
+            <a:pPr algn="ctr"/>
+            <a:r>
+              <a:rPr lang="fr-FR" sz="2400" dirty="0" err="1" smtClean="0">
+                <a:latin typeface="Times New Roman" panose="02020603050405020304" pitchFamily="18" charset="0"/>
+                <a:cs typeface="Times New Roman" panose="02020603050405020304" pitchFamily="18" charset="0"/>
+              </a:rPr>
+              <a:t>Polarizer</a:t>
+            </a:r>
+            <a:endParaRPr lang="fr-FR" sz="2400" dirty="0">
+              <a:latin typeface="Times New Roman" panose="02020603050405020304" pitchFamily="18" charset="0"/>
+              <a:cs typeface="Times New Roman" panose="02020603050405020304" pitchFamily="18" charset="0"/>
+            </a:endParaRPr>
+          </a:p>
+        </p:txBody>
+      </p:sp>
+      <p:sp>
+        <p:nvSpPr>
+          <p:cNvPr id="142" name="ZoneTexte 141"/>
+          <p:cNvSpPr txBox="1"/>
+          <p:nvPr/>
+        </p:nvSpPr>
+        <p:spPr>
+          <a:xfrm>
+            <a:off x="6467143" y="6958106"/>
+            <a:ext cx="1874231" cy="461665"/>
+          </a:xfrm>
+          <a:prstGeom prst="rect">
+            <a:avLst/>
+          </a:prstGeom>
+          <a:noFill/>
+        </p:spPr>
+        <p:txBody>
+          <a:bodyPr wrap="none" rtlCol="0">
+            <a:spAutoFit/>
+          </a:bodyPr>
+          <a:lstStyle/>
+          <a:p>
+            <a:pPr algn="ctr"/>
+            <a:r>
+              <a:rPr lang="fr-FR" sz="2400" dirty="0" err="1" smtClean="0">
+                <a:latin typeface="Times New Roman" panose="02020603050405020304" pitchFamily="18" charset="0"/>
+                <a:cs typeface="Times New Roman" panose="02020603050405020304" pitchFamily="18" charset="0"/>
+              </a:rPr>
+              <a:t>Beamsplitters</a:t>
+            </a:r>
+            <a:endParaRPr lang="fr-FR" sz="2400" dirty="0">
+              <a:latin typeface="Times New Roman" panose="02020603050405020304" pitchFamily="18" charset="0"/>
+              <a:cs typeface="Times New Roman" panose="02020603050405020304" pitchFamily="18" charset="0"/>
+            </a:endParaRPr>
+          </a:p>
+        </p:txBody>
+      </p:sp>
+      <p:cxnSp>
+        <p:nvCxnSpPr>
+          <p:cNvPr id="69" name="Connecteur droit 68"/>
+          <p:cNvCxnSpPr/>
+          <p:nvPr/>
+        </p:nvCxnSpPr>
+        <p:spPr>
+          <a:xfrm>
+            <a:off x="6803518" y="6896424"/>
+            <a:ext cx="75512" cy="151437"/>
+          </a:xfrm>
+          <a:prstGeom prst="line">
+            <a:avLst/>
+          </a:prstGeom>
+          <a:ln>
+            <a:solidFill>
+              <a:schemeClr val="tx1"/>
+            </a:solidFill>
+            <a:headEnd type="stealth"/>
+          </a:ln>
+        </p:spPr>
+        <p:style>
+          <a:lnRef idx="1">
+            <a:schemeClr val="accent1"/>
+          </a:lnRef>
+          <a:fillRef idx="0">
+            <a:schemeClr val="accent1"/>
+          </a:fillRef>
+          <a:effectRef idx="0">
+            <a:schemeClr val="accent1"/>
+          </a:effectRef>
+          <a:fontRef idx="minor">
+            <a:schemeClr val="tx1"/>
+          </a:fontRef>
+        </p:style>
+      </p:cxnSp>
+      <p:cxnSp>
+        <p:nvCxnSpPr>
+          <p:cNvPr id="71" name="Connecteur droit 70"/>
+          <p:cNvCxnSpPr/>
+          <p:nvPr/>
+        </p:nvCxnSpPr>
+        <p:spPr>
+          <a:xfrm flipH="1">
+            <a:off x="8100392" y="6896424"/>
+            <a:ext cx="108545" cy="151437"/>
+          </a:xfrm>
+          <a:prstGeom prst="line">
+            <a:avLst/>
+          </a:prstGeom>
+          <a:ln>
+            <a:solidFill>
+              <a:schemeClr val="tx1"/>
+            </a:solidFill>
+            <a:headEnd type="stealth"/>
+            <a:tailEnd type="none"/>
+          </a:ln>
+        </p:spPr>
+        <p:style>
+          <a:lnRef idx="1">
+            <a:schemeClr val="accent1"/>
+          </a:lnRef>
+          <a:fillRef idx="0">
+            <a:schemeClr val="accent1"/>
+          </a:fillRef>
+          <a:effectRef idx="0">
+            <a:schemeClr val="accent1"/>
+          </a:effectRef>
+          <a:fontRef idx="minor">
+            <a:schemeClr val="tx1"/>
+          </a:fontRef>
+        </p:style>
+      </p:cxnSp>
+      <p:sp>
+        <p:nvSpPr>
+          <p:cNvPr id="147" name="ZoneTexte 146"/>
+          <p:cNvSpPr txBox="1"/>
+          <p:nvPr/>
+        </p:nvSpPr>
+        <p:spPr>
+          <a:xfrm>
+            <a:off x="5180776" y="9160157"/>
+            <a:ext cx="1585690" cy="830997"/>
+          </a:xfrm>
+          <a:prstGeom prst="rect">
+            <a:avLst/>
+          </a:prstGeom>
+          <a:noFill/>
+        </p:spPr>
+        <p:txBody>
+          <a:bodyPr wrap="none" rtlCol="0">
+            <a:spAutoFit/>
+          </a:bodyPr>
+          <a:lstStyle/>
+          <a:p>
+            <a:pPr algn="ctr"/>
+            <a:r>
+              <a:rPr lang="fr-FR" sz="2400" dirty="0" smtClean="0">
+                <a:latin typeface="Times New Roman" panose="02020603050405020304" pitchFamily="18" charset="0"/>
+                <a:cs typeface="Times New Roman" panose="02020603050405020304" pitchFamily="18" charset="0"/>
+              </a:rPr>
+              <a:t>Avalanche</a:t>
+            </a:r>
+          </a:p>
+          <a:p>
+            <a:pPr algn="ctr"/>
+            <a:r>
+              <a:rPr lang="fr-FR" sz="2400" dirty="0" smtClean="0">
+                <a:latin typeface="Times New Roman" panose="02020603050405020304" pitchFamily="18" charset="0"/>
+                <a:cs typeface="Times New Roman" panose="02020603050405020304" pitchFamily="18" charset="0"/>
+              </a:rPr>
+              <a:t>Photodiode</a:t>
+            </a:r>
+            <a:endParaRPr lang="fr-FR" sz="2400" dirty="0">
+              <a:latin typeface="Times New Roman" panose="02020603050405020304" pitchFamily="18" charset="0"/>
+              <a:cs typeface="Times New Roman" panose="02020603050405020304" pitchFamily="18" charset="0"/>
+            </a:endParaRPr>
+          </a:p>
+        </p:txBody>
+      </p:sp>
+      <p:cxnSp>
+        <p:nvCxnSpPr>
+          <p:cNvPr id="148" name="Connecteur droit 147"/>
+          <p:cNvCxnSpPr/>
+          <p:nvPr/>
+        </p:nvCxnSpPr>
+        <p:spPr>
+          <a:xfrm flipH="1" flipV="1">
+            <a:off x="6484341" y="9929198"/>
+            <a:ext cx="157715" cy="205972"/>
+          </a:xfrm>
+          <a:prstGeom prst="line">
+            <a:avLst/>
+          </a:prstGeom>
+          <a:ln>
+            <a:solidFill>
+              <a:schemeClr val="tx1"/>
+            </a:solidFill>
+            <a:headEnd type="stealth"/>
+            <a:tailEnd type="none"/>
+          </a:ln>
+        </p:spPr>
+        <p:style>
+          <a:lnRef idx="1">
+            <a:schemeClr val="accent1"/>
+          </a:lnRef>
+          <a:fillRef idx="0">
+            <a:schemeClr val="accent1"/>
+          </a:fillRef>
+          <a:effectRef idx="0">
+            <a:schemeClr val="accent1"/>
+          </a:effectRef>
+          <a:fontRef idx="minor">
+            <a:schemeClr val="tx1"/>
+          </a:fontRef>
+        </p:style>
+      </p:cxnSp>
     </p:spTree>
     <p:extLst>
       <p:ext uri="{BB962C8B-B14F-4D97-AF65-F5344CB8AC3E}">

</xml_diff>

<commit_message>
Chap05: Correction of the experiment to put the lambda/2 at the right place.
</commit_message>
<xml_diff>
--- a/05-CrDyn/Pictures/ExperimentSchema.pptx
+++ b/05-CrDyn/Pictures/ExperimentSchema.pptx
@@ -288,7 +288,7 @@
           <a:p>
             <a:fld id="{B016335D-3260-4588-AF31-90AD8532CCCE}" type="datetimeFigureOut">
               <a:rPr lang="fr-FR" smtClean="0"/>
-              <a:t>04/07/2017</a:t>
+              <a:t>05/07/2017</a:t>
             </a:fld>
             <a:endParaRPr lang="fr-FR"/>
           </a:p>
@@ -458,7 +458,7 @@
           <a:p>
             <a:fld id="{B016335D-3260-4588-AF31-90AD8532CCCE}" type="datetimeFigureOut">
               <a:rPr lang="fr-FR" smtClean="0"/>
-              <a:t>04/07/2017</a:t>
+              <a:t>05/07/2017</a:t>
             </a:fld>
             <a:endParaRPr lang="fr-FR"/>
           </a:p>
@@ -638,7 +638,7 @@
           <a:p>
             <a:fld id="{B016335D-3260-4588-AF31-90AD8532CCCE}" type="datetimeFigureOut">
               <a:rPr lang="fr-FR" smtClean="0"/>
-              <a:t>04/07/2017</a:t>
+              <a:t>05/07/2017</a:t>
             </a:fld>
             <a:endParaRPr lang="fr-FR"/>
           </a:p>
@@ -808,7 +808,7 @@
           <a:p>
             <a:fld id="{B016335D-3260-4588-AF31-90AD8532CCCE}" type="datetimeFigureOut">
               <a:rPr lang="fr-FR" smtClean="0"/>
-              <a:t>04/07/2017</a:t>
+              <a:t>05/07/2017</a:t>
             </a:fld>
             <a:endParaRPr lang="fr-FR"/>
           </a:p>
@@ -1054,7 +1054,7 @@
           <a:p>
             <a:fld id="{B016335D-3260-4588-AF31-90AD8532CCCE}" type="datetimeFigureOut">
               <a:rPr lang="fr-FR" smtClean="0"/>
-              <a:t>04/07/2017</a:t>
+              <a:t>05/07/2017</a:t>
             </a:fld>
             <a:endParaRPr lang="fr-FR"/>
           </a:p>
@@ -1342,7 +1342,7 @@
           <a:p>
             <a:fld id="{B016335D-3260-4588-AF31-90AD8532CCCE}" type="datetimeFigureOut">
               <a:rPr lang="fr-FR" smtClean="0"/>
-              <a:t>04/07/2017</a:t>
+              <a:t>05/07/2017</a:t>
             </a:fld>
             <a:endParaRPr lang="fr-FR"/>
           </a:p>
@@ -1764,7 +1764,7 @@
           <a:p>
             <a:fld id="{B016335D-3260-4588-AF31-90AD8532CCCE}" type="datetimeFigureOut">
               <a:rPr lang="fr-FR" smtClean="0"/>
-              <a:t>04/07/2017</a:t>
+              <a:t>05/07/2017</a:t>
             </a:fld>
             <a:endParaRPr lang="fr-FR"/>
           </a:p>
@@ -1882,7 +1882,7 @@
           <a:p>
             <a:fld id="{B016335D-3260-4588-AF31-90AD8532CCCE}" type="datetimeFigureOut">
               <a:rPr lang="fr-FR" smtClean="0"/>
-              <a:t>04/07/2017</a:t>
+              <a:t>05/07/2017</a:t>
             </a:fld>
             <a:endParaRPr lang="fr-FR"/>
           </a:p>
@@ -1977,7 +1977,7 @@
           <a:p>
             <a:fld id="{B016335D-3260-4588-AF31-90AD8532CCCE}" type="datetimeFigureOut">
               <a:rPr lang="fr-FR" smtClean="0"/>
-              <a:t>04/07/2017</a:t>
+              <a:t>05/07/2017</a:t>
             </a:fld>
             <a:endParaRPr lang="fr-FR"/>
           </a:p>
@@ -2254,7 +2254,7 @@
           <a:p>
             <a:fld id="{B016335D-3260-4588-AF31-90AD8532CCCE}" type="datetimeFigureOut">
               <a:rPr lang="fr-FR" smtClean="0"/>
-              <a:t>04/07/2017</a:t>
+              <a:t>05/07/2017</a:t>
             </a:fld>
             <a:endParaRPr lang="fr-FR"/>
           </a:p>
@@ -2507,7 +2507,7 @@
           <a:p>
             <a:fld id="{B016335D-3260-4588-AF31-90AD8532CCCE}" type="datetimeFigureOut">
               <a:rPr lang="fr-FR" smtClean="0"/>
-              <a:t>04/07/2017</a:t>
+              <a:t>05/07/2017</a:t>
             </a:fld>
             <a:endParaRPr lang="fr-FR"/>
           </a:p>
@@ -2720,7 +2720,7 @@
           <a:p>
             <a:fld id="{B016335D-3260-4588-AF31-90AD8532CCCE}" type="datetimeFigureOut">
               <a:rPr lang="fr-FR" smtClean="0"/>
-              <a:t>04/07/2017</a:t>
+              <a:t>05/07/2017</a:t>
             </a:fld>
             <a:endParaRPr lang="fr-FR"/>
           </a:p>
@@ -3097,13 +3097,13 @@
       </p:grpSpPr>
       <p:cxnSp>
         <p:nvCxnSpPr>
-          <p:cNvPr id="134" name="Connecteur droit 133"/>
+          <p:cNvPr id="95" name="Connecteur droit 94"/>
           <p:cNvCxnSpPr/>
           <p:nvPr/>
         </p:nvCxnSpPr>
         <p:spPr>
-          <a:xfrm rot="5400000">
-            <a:off x="5506902" y="6626507"/>
+          <a:xfrm>
+            <a:off x="6292712" y="5870382"/>
             <a:ext cx="792088" cy="0"/>
           </a:xfrm>
           <a:prstGeom prst="line">
@@ -3789,7 +3789,9 @@
           </a:prstGeom>
           <a:ln w="28575">
             <a:solidFill>
-              <a:srgbClr val="FF0000"/>
+              <a:srgbClr val="FF0000">
+                <a:alpha val="15000"/>
+              </a:srgbClr>
             </a:solidFill>
             <a:prstDash val="dash"/>
           </a:ln>
@@ -3827,7 +3829,9 @@
           </a:prstGeom>
           <a:ln w="28575">
             <a:solidFill>
-              <a:srgbClr val="FF0000"/>
+              <a:srgbClr val="FF0000">
+                <a:alpha val="15000"/>
+              </a:srgbClr>
             </a:solidFill>
             <a:prstDash val="dash"/>
           </a:ln>
@@ -4081,7 +4085,9 @@
           </a:prstGeom>
           <a:ln w="28575">
             <a:solidFill>
-              <a:schemeClr val="accent6"/>
+              <a:schemeClr val="accent6">
+                <a:alpha val="15000"/>
+              </a:schemeClr>
             </a:solidFill>
             <a:prstDash val="dash"/>
           </a:ln>
@@ -4119,7 +4125,9 @@
           </a:prstGeom>
           <a:ln w="28575">
             <a:solidFill>
-              <a:schemeClr val="accent6"/>
+              <a:schemeClr val="accent6">
+                <a:alpha val="15000"/>
+              </a:schemeClr>
             </a:solidFill>
             <a:prstDash val="dash"/>
           </a:ln>
@@ -6437,7 +6445,7 @@
         </p:nvSpPr>
         <p:spPr>
           <a:xfrm>
-            <a:off x="5616649" y="5814690"/>
+            <a:off x="5697579" y="5641057"/>
             <a:ext cx="572594" cy="461665"/>
           </a:xfrm>
           <a:prstGeom prst="rect">
@@ -6464,7 +6472,7 @@
                 <a:latin typeface="Times New Roman" panose="02020603050405020304" pitchFamily="18" charset="0"/>
                 <a:cs typeface="Times New Roman" panose="02020603050405020304" pitchFamily="18" charset="0"/>
               </a:rPr>
-              <a:t>/4</a:t>
+              <a:t>/2</a:t>
             </a:r>
             <a:endParaRPr lang="fr-FR" sz="2400" dirty="0">
               <a:latin typeface="Times New Roman" panose="02020603050405020304" pitchFamily="18" charset="0"/>

</xml_diff>